<commit_message>
Update RFC per review comments
Signed-off-by: Ralph Castain <rhc@open-mpi.org>
</commit_message>
<xml_diff>
--- a/images/rfc0032/rfc0032.pptx
+++ b/images/rfc0032/rfc0032.pptx
@@ -6,10 +6,11 @@
     <p:sldMasterId id="2147483793" r:id="rId2"/>
   </p:sldMasterIdLst>
   <p:notesMasterIdLst>
-    <p:notesMasterId r:id="rId4"/>
+    <p:notesMasterId r:id="rId5"/>
   </p:notesMasterIdLst>
   <p:sldIdLst>
     <p:sldId id="400" r:id="rId3"/>
+    <p:sldId id="401" r:id="rId4"/>
   </p:sldIdLst>
   <p:sldSz cx="9144000" cy="6858000" type="screen4x3"/>
   <p:notesSz cx="6858000" cy="9144000"/>
@@ -309,10 +310,10 @@
           </a:ln>
           <a:extLst>
             <a:ext uri="{FAA26D3D-D897-4be2-8F04-BA451C77F1D7}">
-              <ma14:placeholderFlag xmlns:ma14="http://schemas.microsoft.com/office/mac/drawingml/2011/main" xmlns="" val="1"/>
+              <ma14:placeholderFlag xmlns="" xmlns:ma14="http://schemas.microsoft.com/office/mac/drawingml/2011/main" val="1"/>
             </a:ext>
             <a:ext uri="{909E8E84-426E-40dd-AFC4-6F175D3DCCD1}">
-              <a14:hiddenFill xmlns:a14="http://schemas.microsoft.com/office/drawing/2010/main" xmlns="">
+              <a14:hiddenFill xmlns="" xmlns:a14="http://schemas.microsoft.com/office/drawing/2010/main">
                 <a:solidFill>
                   <a:srgbClr val="FFFFFF"/>
                 </a:solidFill>
@@ -754,7 +755,7 @@
             </a:ln>
             <a:extLst>
               <a:ext uri="{91240B29-F687-4f45-9708-019B960494DF}">
-                <a14:hiddenLine xmlns:a14="http://schemas.microsoft.com/office/drawing/2010/main" xmlns="" w="9525">
+                <a14:hiddenLine xmlns="" xmlns:a14="http://schemas.microsoft.com/office/drawing/2010/main" w="9525">
                   <a:solidFill>
                     <a:srgbClr val="000000"/>
                   </a:solidFill>
@@ -1484,14 +1485,14 @@
           </a:ln>
           <a:extLst>
             <a:ext uri="{909E8E84-426E-40dd-AFC4-6F175D3DCCD1}">
-              <a14:hiddenFill xmlns:a14="http://schemas.microsoft.com/office/drawing/2010/main" xmlns="">
+              <a14:hiddenFill xmlns="" xmlns:a14="http://schemas.microsoft.com/office/drawing/2010/main">
                 <a:solidFill>
                   <a:srgbClr val="FFFFFF"/>
                 </a:solidFill>
               </a14:hiddenFill>
             </a:ext>
             <a:ext uri="{91240B29-F687-4f45-9708-019B960494DF}">
-              <a14:hiddenLine xmlns:a14="http://schemas.microsoft.com/office/drawing/2010/main" xmlns="" w="9525">
+              <a14:hiddenLine xmlns="" xmlns:a14="http://schemas.microsoft.com/office/drawing/2010/main" w="9525">
                 <a:solidFill>
                   <a:srgbClr val="000000"/>
                 </a:solidFill>
@@ -1612,14 +1613,14 @@
           </a:ln>
           <a:extLst>
             <a:ext uri="{909E8E84-426E-40dd-AFC4-6F175D3DCCD1}">
-              <a14:hiddenFill xmlns:a14="http://schemas.microsoft.com/office/drawing/2010/main" xmlns="">
+              <a14:hiddenFill xmlns="" xmlns:a14="http://schemas.microsoft.com/office/drawing/2010/main">
                 <a:solidFill>
                   <a:srgbClr val="FFFFFF"/>
                 </a:solidFill>
               </a14:hiddenFill>
             </a:ext>
             <a:ext uri="{91240B29-F687-4f45-9708-019B960494DF}">
-              <a14:hiddenLine xmlns:a14="http://schemas.microsoft.com/office/drawing/2010/main" xmlns="" w="9525">
+              <a14:hiddenLine xmlns="" xmlns:a14="http://schemas.microsoft.com/office/drawing/2010/main" w="9525">
                 <a:solidFill>
                   <a:srgbClr val="000000"/>
                 </a:solidFill>
@@ -4580,17 +4581,17 @@
           </a:ln>
           <a:extLst>
             <a:ext uri="{FAA26D3D-D897-4be2-8F04-BA451C77F1D7}">
-              <ma14:placeholderFlag xmlns:ma14="http://schemas.microsoft.com/office/mac/drawingml/2011/main" xmlns="" val="1"/>
+              <ma14:placeholderFlag xmlns="" xmlns:ma14="http://schemas.microsoft.com/office/mac/drawingml/2011/main" val="1"/>
             </a:ext>
             <a:ext uri="{909E8E84-426E-40dd-AFC4-6F175D3DCCD1}">
-              <a14:hiddenFill xmlns:a14="http://schemas.microsoft.com/office/drawing/2010/main" xmlns="">
+              <a14:hiddenFill xmlns="" xmlns:a14="http://schemas.microsoft.com/office/drawing/2010/main">
                 <a:solidFill>
                   <a:srgbClr val="FFFFFF"/>
                 </a:solidFill>
               </a14:hiddenFill>
             </a:ext>
             <a:ext uri="{91240B29-F687-4f45-9708-019B960494DF}">
-              <a14:hiddenLine xmlns:a14="http://schemas.microsoft.com/office/drawing/2010/main" xmlns="" w="9525">
+              <a14:hiddenLine xmlns="" xmlns:a14="http://schemas.microsoft.com/office/drawing/2010/main" w="9525">
                 <a:solidFill>
                   <a:srgbClr val="000000"/>
                 </a:solidFill>
@@ -4757,7 +4758,7 @@
             </a:ln>
             <a:extLst>
               <a:ext uri="{91240B29-F687-4f45-9708-019B960494DF}">
-                <a14:hiddenLine xmlns:a14="http://schemas.microsoft.com/office/drawing/2010/main" xmlns="" w="9525">
+                <a14:hiddenLine xmlns="" xmlns:a14="http://schemas.microsoft.com/office/drawing/2010/main" w="9525">
                   <a:solidFill>
                     <a:srgbClr val="000000"/>
                   </a:solidFill>
@@ -4801,17 +4802,17 @@
           </a:ln>
           <a:extLst>
             <a:ext uri="{FAA26D3D-D897-4be2-8F04-BA451C77F1D7}">
-              <ma14:placeholderFlag xmlns:ma14="http://schemas.microsoft.com/office/mac/drawingml/2011/main" xmlns="" val="1"/>
+              <ma14:placeholderFlag xmlns="" xmlns:ma14="http://schemas.microsoft.com/office/mac/drawingml/2011/main" val="1"/>
             </a:ext>
             <a:ext uri="{909E8E84-426E-40dd-AFC4-6F175D3DCCD1}">
-              <a14:hiddenFill xmlns:a14="http://schemas.microsoft.com/office/drawing/2010/main" xmlns="">
+              <a14:hiddenFill xmlns="" xmlns:a14="http://schemas.microsoft.com/office/drawing/2010/main">
                 <a:solidFill>
                   <a:srgbClr val="FFFFFF"/>
                 </a:solidFill>
               </a14:hiddenFill>
             </a:ext>
             <a:ext uri="{91240B29-F687-4f45-9708-019B960494DF}">
-              <a14:hiddenLine xmlns:a14="http://schemas.microsoft.com/office/drawing/2010/main" xmlns="" w="9525">
+              <a14:hiddenLine xmlns="" xmlns:a14="http://schemas.microsoft.com/office/drawing/2010/main" w="9525">
                 <a:solidFill>
                   <a:srgbClr val="000000"/>
                 </a:solidFill>
@@ -5361,14 +5362,14 @@
           </a:ln>
           <a:extLst>
             <a:ext uri="{909E8E84-426E-40dd-AFC4-6F175D3DCCD1}">
-              <a14:hiddenFill xmlns:a14="http://schemas.microsoft.com/office/drawing/2010/main" xmlns="">
+              <a14:hiddenFill xmlns="" xmlns:a14="http://schemas.microsoft.com/office/drawing/2010/main">
                 <a:solidFill>
                   <a:srgbClr val="FFFFFF"/>
                 </a:solidFill>
               </a14:hiddenFill>
             </a:ext>
             <a:ext uri="{91240B29-F687-4f45-9708-019B960494DF}">
-              <a14:hiddenLine xmlns:a14="http://schemas.microsoft.com/office/drawing/2010/main" xmlns="" w="9525">
+              <a14:hiddenLine xmlns="" xmlns:a14="http://schemas.microsoft.com/office/drawing/2010/main" w="9525">
                 <a:solidFill>
                   <a:srgbClr val="000000"/>
                 </a:solidFill>
@@ -5420,14 +5421,14 @@
           </a:ln>
           <a:extLst>
             <a:ext uri="{909E8E84-426E-40dd-AFC4-6F175D3DCCD1}">
-              <a14:hiddenFill xmlns:a14="http://schemas.microsoft.com/office/drawing/2010/main" xmlns="">
+              <a14:hiddenFill xmlns="" xmlns:a14="http://schemas.microsoft.com/office/drawing/2010/main">
                 <a:solidFill>
                   <a:srgbClr val="FFFFFF"/>
                 </a:solidFill>
               </a14:hiddenFill>
             </a:ext>
             <a:ext uri="{91240B29-F687-4f45-9708-019B960494DF}">
-              <a14:hiddenLine xmlns:a14="http://schemas.microsoft.com/office/drawing/2010/main" xmlns="" w="9525">
+              <a14:hiddenLine xmlns="" xmlns:a14="http://schemas.microsoft.com/office/drawing/2010/main" w="9525">
                 <a:solidFill>
                   <a:srgbClr val="000000"/>
                 </a:solidFill>
@@ -6102,14 +6103,14 @@
           <a:effectLst/>
           <a:extLst>
             <a:ext uri="{909E8E84-426E-40dd-AFC4-6F175D3DCCD1}">
-              <a14:hiddenFill xmlns="" xmlns:a14="http://schemas.microsoft.com/office/drawing/2010/main">
+              <a14:hiddenFill xmlns:a14="http://schemas.microsoft.com/office/drawing/2010/main" xmlns="">
                 <a:solidFill>
                   <a:srgbClr val="00B8FF"/>
                 </a:solidFill>
               </a14:hiddenFill>
             </a:ext>
             <a:ext uri="{91240B29-F687-4f45-9708-019B960494DF}">
-              <a14:hiddenLine xmlns="" xmlns:a14="http://schemas.microsoft.com/office/drawing/2010/main" w="9525">
+              <a14:hiddenLine xmlns:a14="http://schemas.microsoft.com/office/drawing/2010/main" xmlns="" w="9525">
                 <a:solidFill>
                   <a:schemeClr val="tx1"/>
                 </a:solidFill>
@@ -6119,7 +6120,7 @@
               </a14:hiddenLine>
             </a:ext>
             <a:ext uri="{AF507438-7753-43e0-B8FC-AC1667EBCBE1}">
-              <a14:hiddenEffects xmlns="" xmlns:a14="http://schemas.microsoft.com/office/drawing/2010/main">
+              <a14:hiddenEffects xmlns:a14="http://schemas.microsoft.com/office/drawing/2010/main" xmlns="">
                 <a:effectLst>
                   <a:outerShdw blurRad="63500" dist="38099" dir="2700000" algn="ctr" rotWithShape="0">
                     <a:schemeClr val="bg2">
@@ -7654,6 +7655,1877 @@
     <p:extLst>
       <p:ext uri="{BB962C8B-B14F-4D97-AF65-F5344CB8AC3E}">
         <p14:creationId xmlns:p14="http://schemas.microsoft.com/office/powerpoint/2010/main" val="847180672"/>
+      </p:ext>
+    </p:extLst>
+  </p:cSld>
+  <p:clrMapOvr>
+    <a:masterClrMapping/>
+  </p:clrMapOvr>
+</p:sld>
+</file>
+
+<file path=ppt/slides/slide2.xml><?xml version="1.0" encoding="utf-8"?>
+<p:sld xmlns:a="http://schemas.openxmlformats.org/drawingml/2006/main" xmlns:r="http://schemas.openxmlformats.org/officeDocument/2006/relationships" xmlns:p="http://schemas.openxmlformats.org/presentationml/2006/main" showMasterSp="0">
+  <p:cSld>
+    <p:spTree>
+      <p:nvGrpSpPr>
+        <p:cNvPr id="1" name=""/>
+        <p:cNvGrpSpPr/>
+        <p:nvPr/>
+      </p:nvGrpSpPr>
+      <p:grpSpPr>
+        <a:xfrm>
+          <a:off x="0" y="0"/>
+          <a:ext cx="0" cy="0"/>
+          <a:chOff x="0" y="0"/>
+          <a:chExt cx="0" cy="0"/>
+        </a:xfrm>
+      </p:grpSpPr>
+      <p:sp>
+        <p:nvSpPr>
+          <p:cNvPr id="62" name="Oval 61">
+            <a:extLst>
+              <a:ext uri="{FF2B5EF4-FFF2-40B4-BE49-F238E27FC236}">
+                <a16:creationId xmlns:a16="http://schemas.microsoft.com/office/drawing/2014/main" id="{647F5603-AF99-A546-99E8-C1FE4874B1F6}"/>
+              </a:ext>
+            </a:extLst>
+          </p:cNvPr>
+          <p:cNvSpPr/>
+          <p:nvPr/>
+        </p:nvSpPr>
+        <p:spPr bwMode="auto">
+          <a:xfrm>
+            <a:off x="2397219" y="2034041"/>
+            <a:ext cx="1676400" cy="1676400"/>
+          </a:xfrm>
+          <a:prstGeom prst="ellipse">
+            <a:avLst/>
+          </a:prstGeom>
+          <a:solidFill>
+            <a:srgbClr val="FFC000"/>
+          </a:solidFill>
+          <a:ln w="9525" cap="flat" cmpd="sng" algn="ctr">
+            <a:solidFill>
+              <a:schemeClr val="tx1"/>
+            </a:solidFill>
+            <a:prstDash val="solid"/>
+            <a:round/>
+            <a:headEnd type="none" w="med" len="med"/>
+            <a:tailEnd type="none" w="med" len="med"/>
+          </a:ln>
+          <a:effectLst/>
+        </p:spPr>
+        <p:txBody>
+          <a:bodyPr vert="horz" wrap="square" lIns="91440" tIns="45720" rIns="91440" bIns="45720" numCol="1" rtlCol="0" anchor="t" anchorCtr="0" compatLnSpc="1">
+            <a:prstTxWarp prst="textNoShape">
+              <a:avLst/>
+            </a:prstTxWarp>
+          </a:bodyPr>
+          <a:lstStyle/>
+          <a:p>
+            <a:pPr marL="0" marR="0" indent="0" algn="l" defTabSz="914400" rtl="0" eaLnBrk="0" fontAlgn="base" latinLnBrk="0" hangingPunct="0">
+              <a:lnSpc>
+                <a:spcPct val="100000"/>
+              </a:lnSpc>
+              <a:spcBef>
+                <a:spcPct val="0"/>
+              </a:spcBef>
+              <a:spcAft>
+                <a:spcPct val="0"/>
+              </a:spcAft>
+              <a:buClrTx/>
+              <a:buSzTx/>
+              <a:buFontTx/>
+              <a:buNone/>
+              <a:tabLst/>
+            </a:pPr>
+            <a:endParaRPr kumimoji="0" lang="en-US" sz="2400" b="0" i="0" u="none" strike="noStrike" cap="none" normalizeH="0" baseline="0" dirty="0">
+              <a:ln>
+                <a:noFill/>
+              </a:ln>
+              <a:solidFill>
+                <a:schemeClr val="tx1"/>
+              </a:solidFill>
+              <a:effectLst/>
+              <a:latin typeface="Arial" pitchFamily="-65" charset="0"/>
+              <a:ea typeface="ＭＳ Ｐゴシック" pitchFamily="-65" charset="-128"/>
+              <a:cs typeface="ＭＳ Ｐゴシック" pitchFamily="-65" charset="-128"/>
+            </a:endParaRPr>
+          </a:p>
+        </p:txBody>
+      </p:sp>
+      <p:sp>
+        <p:nvSpPr>
+          <p:cNvPr id="63" name="TextBox 62">
+            <a:extLst>
+              <a:ext uri="{FF2B5EF4-FFF2-40B4-BE49-F238E27FC236}">
+                <a16:creationId xmlns:a16="http://schemas.microsoft.com/office/drawing/2014/main" id="{C903AED5-6A4D-8140-B77D-73886E92528E}"/>
+              </a:ext>
+            </a:extLst>
+          </p:cNvPr>
+          <p:cNvSpPr txBox="1"/>
+          <p:nvPr/>
+        </p:nvSpPr>
+        <p:spPr>
+          <a:xfrm>
+            <a:off x="2903437" y="2073113"/>
+            <a:ext cx="663964" cy="461665"/>
+          </a:xfrm>
+          <a:prstGeom prst="rect">
+            <a:avLst/>
+          </a:prstGeom>
+          <a:noFill/>
+        </p:spPr>
+        <p:txBody>
+          <a:bodyPr wrap="none" rtlCol="0">
+            <a:spAutoFit/>
+          </a:bodyPr>
+          <a:lstStyle/>
+          <a:p>
+            <a:r>
+              <a:rPr lang="en-US" dirty="0"/>
+              <a:t>RM</a:t>
+            </a:r>
+          </a:p>
+        </p:txBody>
+      </p:sp>
+      <p:sp>
+        <p:nvSpPr>
+          <p:cNvPr id="64" name="Oval 63">
+            <a:extLst>
+              <a:ext uri="{FF2B5EF4-FFF2-40B4-BE49-F238E27FC236}">
+                <a16:creationId xmlns:a16="http://schemas.microsoft.com/office/drawing/2014/main" id="{3C870C15-3987-2940-8758-D59315AFCCD1}"/>
+              </a:ext>
+            </a:extLst>
+          </p:cNvPr>
+          <p:cNvSpPr/>
+          <p:nvPr/>
+        </p:nvSpPr>
+        <p:spPr>
+          <a:xfrm>
+            <a:off x="2668811" y="2774651"/>
+            <a:ext cx="1133216" cy="695916"/>
+          </a:xfrm>
+          <a:prstGeom prst="ellipse">
+            <a:avLst/>
+          </a:prstGeom>
+          <a:solidFill>
+            <a:srgbClr val="00B050"/>
+          </a:solidFill>
+          <a:ln w="9525">
+            <a:solidFill>
+              <a:schemeClr val="tx1"/>
+            </a:solidFill>
+          </a:ln>
+        </p:spPr>
+        <p:style>
+          <a:lnRef idx="2">
+            <a:schemeClr val="accent1">
+              <a:shade val="50000"/>
+            </a:schemeClr>
+          </a:lnRef>
+          <a:fillRef idx="1">
+            <a:schemeClr val="accent1"/>
+          </a:fillRef>
+          <a:effectRef idx="0">
+            <a:schemeClr val="accent1"/>
+          </a:effectRef>
+          <a:fontRef idx="minor">
+            <a:schemeClr val="lt1"/>
+          </a:fontRef>
+        </p:style>
+        <p:txBody>
+          <a:bodyPr rtlCol="0" anchor="ctr"/>
+          <a:lstStyle/>
+          <a:p>
+            <a:pPr algn="ctr"/>
+            <a:r>
+              <a:rPr lang="en-US" sz="1600" dirty="0">
+                <a:solidFill>
+                  <a:schemeClr val="bg1"/>
+                </a:solidFill>
+              </a:rPr>
+              <a:t>PMIx</a:t>
+            </a:r>
+          </a:p>
+          <a:p>
+            <a:pPr algn="ctr"/>
+            <a:r>
+              <a:rPr lang="en-US" sz="1600" dirty="0">
+                <a:solidFill>
+                  <a:schemeClr val="bg1"/>
+                </a:solidFill>
+              </a:rPr>
+              <a:t>Server</a:t>
+            </a:r>
+          </a:p>
+        </p:txBody>
+      </p:sp>
+      <p:pic>
+        <p:nvPicPr>
+          <p:cNvPr id="65" name="Picture 64">
+            <a:extLst>
+              <a:ext uri="{FF2B5EF4-FFF2-40B4-BE49-F238E27FC236}">
+                <a16:creationId xmlns:a16="http://schemas.microsoft.com/office/drawing/2014/main" id="{2D224509-DBB5-424C-B68F-B34C4EEB8605}"/>
+              </a:ext>
+            </a:extLst>
+          </p:cNvPr>
+          <p:cNvPicPr>
+            <a:picLocks noChangeAspect="1" noChangeArrowheads="1"/>
+          </p:cNvPicPr>
+          <p:nvPr/>
+        </p:nvPicPr>
+        <p:blipFill>
+          <a:blip r:embed="rId2">
+            <a:extLst>
+              <a:ext uri="{28A0092B-C50C-407E-A947-70E740481C1C}">
+                <a14:useLocalDpi xmlns:a14="http://schemas.microsoft.com/office/drawing/2010/main" val="0"/>
+              </a:ext>
+            </a:extLst>
+          </a:blip>
+          <a:srcRect/>
+          <a:stretch>
+            <a:fillRect/>
+          </a:stretch>
+        </p:blipFill>
+        <p:spPr bwMode="auto">
+          <a:xfrm flipH="1">
+            <a:off x="1221888" y="4190874"/>
+            <a:ext cx="1655275" cy="1024848"/>
+          </a:xfrm>
+          <a:prstGeom prst="rect">
+            <a:avLst/>
+          </a:prstGeom>
+          <a:noFill/>
+          <a:ln>
+            <a:noFill/>
+          </a:ln>
+          <a:effectLst/>
+          <a:extLst>
+            <a:ext uri="{909E8E84-426E-40dd-AFC4-6F175D3DCCD1}">
+              <a14:hiddenFill xmlns:a14="http://schemas.microsoft.com/office/drawing/2010/main" xmlns="">
+                <a:solidFill>
+                  <a:srgbClr val="00B8FF"/>
+                </a:solidFill>
+              </a14:hiddenFill>
+            </a:ext>
+            <a:ext uri="{91240B29-F687-4f45-9708-019B960494DF}">
+              <a14:hiddenLine xmlns:a14="http://schemas.microsoft.com/office/drawing/2010/main" xmlns="" w="9525">
+                <a:solidFill>
+                  <a:schemeClr val="tx1"/>
+                </a:solidFill>
+                <a:miter lim="800000"/>
+                <a:headEnd/>
+                <a:tailEnd/>
+              </a14:hiddenLine>
+            </a:ext>
+            <a:ext uri="{AF507438-7753-43e0-B8FC-AC1667EBCBE1}">
+              <a14:hiddenEffects xmlns:a14="http://schemas.microsoft.com/office/drawing/2010/main" xmlns="">
+                <a:effectLst>
+                  <a:outerShdw blurRad="63500" dist="38099" dir="2700000" algn="ctr" rotWithShape="0">
+                    <a:schemeClr val="bg2">
+                      <a:alpha val="74998"/>
+                    </a:schemeClr>
+                  </a:outerShdw>
+                </a:effectLst>
+              </a14:hiddenEffects>
+            </a:ext>
+          </a:extLst>
+        </p:spPr>
+      </p:pic>
+      <p:sp>
+        <p:nvSpPr>
+          <p:cNvPr id="66" name="Oval 65">
+            <a:extLst>
+              <a:ext uri="{FF2B5EF4-FFF2-40B4-BE49-F238E27FC236}">
+                <a16:creationId xmlns:a16="http://schemas.microsoft.com/office/drawing/2014/main" id="{855BBA0C-CA52-3D43-B745-728F0F47EFDA}"/>
+              </a:ext>
+            </a:extLst>
+          </p:cNvPr>
+          <p:cNvSpPr/>
+          <p:nvPr/>
+        </p:nvSpPr>
+        <p:spPr bwMode="auto">
+          <a:xfrm>
+            <a:off x="2382861" y="4607312"/>
+            <a:ext cx="205134" cy="304800"/>
+          </a:xfrm>
+          <a:prstGeom prst="ellipse">
+            <a:avLst/>
+          </a:prstGeom>
+          <a:solidFill>
+            <a:srgbClr val="00B050"/>
+          </a:solidFill>
+          <a:ln w="9525" cap="flat" cmpd="sng" algn="ctr">
+            <a:solidFill>
+              <a:schemeClr val="tx1"/>
+            </a:solidFill>
+            <a:prstDash val="solid"/>
+            <a:round/>
+            <a:headEnd type="none" w="med" len="med"/>
+            <a:tailEnd type="none" w="med" len="med"/>
+          </a:ln>
+          <a:effectLst/>
+        </p:spPr>
+        <p:txBody>
+          <a:bodyPr vert="horz" wrap="square" lIns="91440" tIns="45720" rIns="91440" bIns="45720" numCol="1" rtlCol="0" anchor="t" anchorCtr="0" compatLnSpc="1">
+            <a:prstTxWarp prst="textNoShape">
+              <a:avLst/>
+            </a:prstTxWarp>
+          </a:bodyPr>
+          <a:lstStyle/>
+          <a:p>
+            <a:pPr marL="0" marR="0" indent="0" algn="l" defTabSz="914400" rtl="0" eaLnBrk="0" fontAlgn="base" latinLnBrk="0" hangingPunct="0">
+              <a:lnSpc>
+                <a:spcPct val="100000"/>
+              </a:lnSpc>
+              <a:spcBef>
+                <a:spcPct val="0"/>
+              </a:spcBef>
+              <a:spcAft>
+                <a:spcPct val="0"/>
+              </a:spcAft>
+              <a:buClrTx/>
+              <a:buSzTx/>
+              <a:buFontTx/>
+              <a:buNone/>
+              <a:tabLst/>
+            </a:pPr>
+            <a:endParaRPr kumimoji="0" lang="en-US" sz="2400" b="0" i="0" u="none" strike="noStrike" cap="none" normalizeH="0" baseline="0" dirty="0">
+              <a:ln>
+                <a:noFill/>
+              </a:ln>
+              <a:solidFill>
+                <a:schemeClr val="tx1"/>
+              </a:solidFill>
+              <a:effectLst/>
+              <a:latin typeface="Arial" pitchFamily="-65" charset="0"/>
+              <a:ea typeface="ＭＳ Ｐゴシック" pitchFamily="-65" charset="-128"/>
+              <a:cs typeface="ＭＳ Ｐゴシック" pitchFamily="-65" charset="-128"/>
+            </a:endParaRPr>
+          </a:p>
+        </p:txBody>
+      </p:sp>
+      <p:cxnSp>
+        <p:nvCxnSpPr>
+          <p:cNvPr id="67" name="Straight Connector 66">
+            <a:extLst>
+              <a:ext uri="{FF2B5EF4-FFF2-40B4-BE49-F238E27FC236}">
+                <a16:creationId xmlns:a16="http://schemas.microsoft.com/office/drawing/2014/main" id="{D3EA9752-5936-9E41-B699-D56B366D954B}"/>
+              </a:ext>
+            </a:extLst>
+          </p:cNvPr>
+          <p:cNvCxnSpPr/>
+          <p:nvPr/>
+        </p:nvCxnSpPr>
+        <p:spPr bwMode="auto">
+          <a:xfrm flipV="1">
+            <a:off x="2557954" y="3470567"/>
+            <a:ext cx="677465" cy="1181382"/>
+          </a:xfrm>
+          <a:prstGeom prst="line">
+            <a:avLst/>
+          </a:prstGeom>
+          <a:solidFill>
+            <a:schemeClr val="accent1"/>
+          </a:solidFill>
+          <a:ln w="28575" cap="flat" cmpd="sng" algn="ctr">
+            <a:solidFill>
+              <a:srgbClr val="00B050"/>
+            </a:solidFill>
+            <a:prstDash val="solid"/>
+            <a:round/>
+            <a:headEnd type="none" w="med" len="med"/>
+            <a:tailEnd type="none" w="med" len="med"/>
+          </a:ln>
+          <a:effectLst/>
+        </p:spPr>
+      </p:cxnSp>
+      <p:sp>
+        <p:nvSpPr>
+          <p:cNvPr id="68" name="Oval 67">
+            <a:extLst>
+              <a:ext uri="{FF2B5EF4-FFF2-40B4-BE49-F238E27FC236}">
+                <a16:creationId xmlns:a16="http://schemas.microsoft.com/office/drawing/2014/main" id="{85A30EFE-4271-6E45-B79F-5F4C7765AE06}"/>
+              </a:ext>
+            </a:extLst>
+          </p:cNvPr>
+          <p:cNvSpPr/>
+          <p:nvPr/>
+        </p:nvSpPr>
+        <p:spPr bwMode="auto">
+          <a:xfrm>
+            <a:off x="5114400" y="2034041"/>
+            <a:ext cx="1170182" cy="1170182"/>
+          </a:xfrm>
+          <a:prstGeom prst="ellipse">
+            <a:avLst/>
+          </a:prstGeom>
+          <a:solidFill>
+            <a:srgbClr val="FFC000"/>
+          </a:solidFill>
+          <a:ln w="9525" cap="flat" cmpd="sng" algn="ctr">
+            <a:solidFill>
+              <a:schemeClr val="tx1"/>
+            </a:solidFill>
+            <a:prstDash val="solid"/>
+            <a:round/>
+            <a:headEnd type="none" w="med" len="med"/>
+            <a:tailEnd type="none" w="med" len="med"/>
+          </a:ln>
+          <a:effectLst/>
+        </p:spPr>
+        <p:txBody>
+          <a:bodyPr vert="horz" wrap="square" lIns="91440" tIns="45720" rIns="91440" bIns="45720" numCol="1" rtlCol="0" anchor="t" anchorCtr="0" compatLnSpc="1">
+            <a:prstTxWarp prst="textNoShape">
+              <a:avLst/>
+            </a:prstTxWarp>
+          </a:bodyPr>
+          <a:lstStyle/>
+          <a:p>
+            <a:pPr marL="0" marR="0" indent="0" algn="l" defTabSz="914400" rtl="0" eaLnBrk="0" fontAlgn="base" latinLnBrk="0" hangingPunct="0">
+              <a:lnSpc>
+                <a:spcPct val="100000"/>
+              </a:lnSpc>
+              <a:spcBef>
+                <a:spcPct val="0"/>
+              </a:spcBef>
+              <a:spcAft>
+                <a:spcPct val="0"/>
+              </a:spcAft>
+              <a:buClrTx/>
+              <a:buSzTx/>
+              <a:buFontTx/>
+              <a:buNone/>
+              <a:tabLst/>
+            </a:pPr>
+            <a:endParaRPr kumimoji="0" lang="en-US" sz="2400" b="0" i="0" u="none" strike="noStrike" cap="none" normalizeH="0" baseline="0" dirty="0">
+              <a:ln>
+                <a:noFill/>
+              </a:ln>
+              <a:solidFill>
+                <a:schemeClr val="tx1"/>
+              </a:solidFill>
+              <a:effectLst/>
+              <a:latin typeface="Arial" pitchFamily="-65" charset="0"/>
+              <a:ea typeface="ＭＳ Ｐゴシック" pitchFamily="-65" charset="-128"/>
+              <a:cs typeface="ＭＳ Ｐゴシック" pitchFamily="-65" charset="-128"/>
+            </a:endParaRPr>
+          </a:p>
+        </p:txBody>
+      </p:sp>
+      <p:sp>
+        <p:nvSpPr>
+          <p:cNvPr id="69" name="TextBox 68">
+            <a:extLst>
+              <a:ext uri="{FF2B5EF4-FFF2-40B4-BE49-F238E27FC236}">
+                <a16:creationId xmlns:a16="http://schemas.microsoft.com/office/drawing/2014/main" id="{B203E893-03E3-ED42-9531-690AFB1D6A9C}"/>
+              </a:ext>
+            </a:extLst>
+          </p:cNvPr>
+          <p:cNvSpPr txBox="1"/>
+          <p:nvPr/>
+        </p:nvSpPr>
+        <p:spPr>
+          <a:xfrm>
+            <a:off x="5427621" y="2023186"/>
+            <a:ext cx="543739" cy="369332"/>
+          </a:xfrm>
+          <a:prstGeom prst="rect">
+            <a:avLst/>
+          </a:prstGeom>
+          <a:noFill/>
+        </p:spPr>
+        <p:txBody>
+          <a:bodyPr wrap="none" rtlCol="0">
+            <a:spAutoFit/>
+          </a:bodyPr>
+          <a:lstStyle/>
+          <a:p>
+            <a:r>
+              <a:rPr lang="en-US" sz="1800" dirty="0"/>
+              <a:t>RM</a:t>
+            </a:r>
+          </a:p>
+        </p:txBody>
+      </p:sp>
+      <p:sp>
+        <p:nvSpPr>
+          <p:cNvPr id="70" name="Oval 69">
+            <a:extLst>
+              <a:ext uri="{FF2B5EF4-FFF2-40B4-BE49-F238E27FC236}">
+                <a16:creationId xmlns:a16="http://schemas.microsoft.com/office/drawing/2014/main" id="{CB5A0CC8-D438-5341-897A-5F23C55B9610}"/>
+              </a:ext>
+            </a:extLst>
+          </p:cNvPr>
+          <p:cNvSpPr/>
+          <p:nvPr/>
+        </p:nvSpPr>
+        <p:spPr>
+          <a:xfrm>
+            <a:off x="5250196" y="2573850"/>
+            <a:ext cx="898590" cy="551831"/>
+          </a:xfrm>
+          <a:prstGeom prst="ellipse">
+            <a:avLst/>
+          </a:prstGeom>
+          <a:solidFill>
+            <a:srgbClr val="00B050"/>
+          </a:solidFill>
+          <a:ln w="9525">
+            <a:solidFill>
+              <a:schemeClr val="tx1"/>
+            </a:solidFill>
+          </a:ln>
+        </p:spPr>
+        <p:style>
+          <a:lnRef idx="2">
+            <a:schemeClr val="accent1">
+              <a:shade val="50000"/>
+            </a:schemeClr>
+          </a:lnRef>
+          <a:fillRef idx="1">
+            <a:schemeClr val="accent1"/>
+          </a:fillRef>
+          <a:effectRef idx="0">
+            <a:schemeClr val="accent1"/>
+          </a:effectRef>
+          <a:fontRef idx="minor">
+            <a:schemeClr val="lt1"/>
+          </a:fontRef>
+        </p:style>
+        <p:txBody>
+          <a:bodyPr rtlCol="0" anchor="ctr"/>
+          <a:lstStyle/>
+          <a:p>
+            <a:pPr algn="ctr"/>
+            <a:r>
+              <a:rPr lang="en-US" sz="1200" dirty="0">
+                <a:solidFill>
+                  <a:schemeClr val="bg1"/>
+                </a:solidFill>
+              </a:rPr>
+              <a:t>PMIx</a:t>
+            </a:r>
+          </a:p>
+          <a:p>
+            <a:pPr algn="ctr"/>
+            <a:r>
+              <a:rPr lang="en-US" sz="1200" dirty="0">
+                <a:solidFill>
+                  <a:schemeClr val="bg1"/>
+                </a:solidFill>
+              </a:rPr>
+              <a:t>Server</a:t>
+            </a:r>
+          </a:p>
+        </p:txBody>
+      </p:sp>
+      <p:sp>
+        <p:nvSpPr>
+          <p:cNvPr id="71" name="Rounded Rectangle 70">
+            <a:extLst>
+              <a:ext uri="{FF2B5EF4-FFF2-40B4-BE49-F238E27FC236}">
+                <a16:creationId xmlns:a16="http://schemas.microsoft.com/office/drawing/2014/main" id="{61482EBE-5902-734A-A8FF-7EB71958C917}"/>
+              </a:ext>
+            </a:extLst>
+          </p:cNvPr>
+          <p:cNvSpPr/>
+          <p:nvPr/>
+        </p:nvSpPr>
+        <p:spPr>
+          <a:xfrm>
+            <a:off x="4945928" y="3710440"/>
+            <a:ext cx="481693" cy="350817"/>
+          </a:xfrm>
+          <a:prstGeom prst="roundRect">
+            <a:avLst/>
+          </a:prstGeom>
+          <a:pattFill prst="pct10">
+            <a:fgClr>
+              <a:schemeClr val="accent1"/>
+            </a:fgClr>
+            <a:bgClr>
+              <a:schemeClr val="bg1"/>
+            </a:bgClr>
+          </a:pattFill>
+          <a:ln>
+            <a:solidFill>
+              <a:schemeClr val="tx1"/>
+            </a:solidFill>
+          </a:ln>
+        </p:spPr>
+        <p:style>
+          <a:lnRef idx="2">
+            <a:schemeClr val="accent1">
+              <a:shade val="50000"/>
+            </a:schemeClr>
+          </a:lnRef>
+          <a:fillRef idx="1">
+            <a:schemeClr val="accent1"/>
+          </a:fillRef>
+          <a:effectRef idx="0">
+            <a:schemeClr val="accent1"/>
+          </a:effectRef>
+          <a:fontRef idx="minor">
+            <a:schemeClr val="lt1"/>
+          </a:fontRef>
+        </p:style>
+        <p:txBody>
+          <a:bodyPr lIns="0" rIns="0" rtlCol="0" anchor="ctr"/>
+          <a:lstStyle/>
+          <a:p>
+            <a:pPr algn="ctr"/>
+            <a:r>
+              <a:rPr lang="en-US" sz="1200" dirty="0">
+                <a:solidFill>
+                  <a:schemeClr val="tx1"/>
+                </a:solidFill>
+              </a:rPr>
+              <a:t>Proc</a:t>
+            </a:r>
+            <a:endParaRPr lang="en-US" sz="1800" dirty="0">
+              <a:solidFill>
+                <a:schemeClr val="tx1"/>
+              </a:solidFill>
+            </a:endParaRPr>
+          </a:p>
+        </p:txBody>
+      </p:sp>
+      <p:sp>
+        <p:nvSpPr>
+          <p:cNvPr id="72" name="Rounded Rectangle 71">
+            <a:extLst>
+              <a:ext uri="{FF2B5EF4-FFF2-40B4-BE49-F238E27FC236}">
+                <a16:creationId xmlns:a16="http://schemas.microsoft.com/office/drawing/2014/main" id="{45610627-9AB4-9247-B548-214F97A95831}"/>
+              </a:ext>
+            </a:extLst>
+          </p:cNvPr>
+          <p:cNvSpPr/>
+          <p:nvPr/>
+        </p:nvSpPr>
+        <p:spPr>
+          <a:xfrm>
+            <a:off x="6059083" y="3710440"/>
+            <a:ext cx="481693" cy="350817"/>
+          </a:xfrm>
+          <a:prstGeom prst="roundRect">
+            <a:avLst/>
+          </a:prstGeom>
+          <a:pattFill prst="pct10">
+            <a:fgClr>
+              <a:schemeClr val="accent1"/>
+            </a:fgClr>
+            <a:bgClr>
+              <a:schemeClr val="bg1"/>
+            </a:bgClr>
+          </a:pattFill>
+          <a:ln>
+            <a:solidFill>
+              <a:schemeClr val="tx1"/>
+            </a:solidFill>
+          </a:ln>
+        </p:spPr>
+        <p:style>
+          <a:lnRef idx="2">
+            <a:schemeClr val="accent1">
+              <a:shade val="50000"/>
+            </a:schemeClr>
+          </a:lnRef>
+          <a:fillRef idx="1">
+            <a:schemeClr val="accent1"/>
+          </a:fillRef>
+          <a:effectRef idx="0">
+            <a:schemeClr val="accent1"/>
+          </a:effectRef>
+          <a:fontRef idx="minor">
+            <a:schemeClr val="lt1"/>
+          </a:fontRef>
+        </p:style>
+        <p:txBody>
+          <a:bodyPr lIns="0" rIns="0" rtlCol="0" anchor="ctr"/>
+          <a:lstStyle/>
+          <a:p>
+            <a:pPr algn="ctr"/>
+            <a:r>
+              <a:rPr lang="en-US" sz="1200" dirty="0">
+                <a:solidFill>
+                  <a:schemeClr val="tx1"/>
+                </a:solidFill>
+              </a:rPr>
+              <a:t>Proc</a:t>
+            </a:r>
+            <a:endParaRPr lang="en-US" sz="1800" dirty="0">
+              <a:solidFill>
+                <a:schemeClr val="tx1"/>
+              </a:solidFill>
+            </a:endParaRPr>
+          </a:p>
+        </p:txBody>
+      </p:sp>
+      <p:cxnSp>
+        <p:nvCxnSpPr>
+          <p:cNvPr id="73" name="Straight Connector 72">
+            <a:extLst>
+              <a:ext uri="{FF2B5EF4-FFF2-40B4-BE49-F238E27FC236}">
+                <a16:creationId xmlns:a16="http://schemas.microsoft.com/office/drawing/2014/main" id="{7DD58A06-98EF-B644-9D17-38B93D57DFAA}"/>
+              </a:ext>
+            </a:extLst>
+          </p:cNvPr>
+          <p:cNvCxnSpPr/>
+          <p:nvPr/>
+        </p:nvCxnSpPr>
+        <p:spPr bwMode="auto">
+          <a:xfrm flipH="1">
+            <a:off x="5186775" y="3125681"/>
+            <a:ext cx="512716" cy="584759"/>
+          </a:xfrm>
+          <a:prstGeom prst="line">
+            <a:avLst/>
+          </a:prstGeom>
+          <a:solidFill>
+            <a:schemeClr val="accent1"/>
+          </a:solidFill>
+          <a:ln w="28575" cap="flat" cmpd="sng" algn="ctr">
+            <a:solidFill>
+              <a:srgbClr val="00B050"/>
+            </a:solidFill>
+            <a:prstDash val="solid"/>
+            <a:round/>
+            <a:headEnd type="none" w="med" len="med"/>
+            <a:tailEnd type="none" w="med" len="med"/>
+          </a:ln>
+          <a:effectLst/>
+        </p:spPr>
+      </p:cxnSp>
+      <p:cxnSp>
+        <p:nvCxnSpPr>
+          <p:cNvPr id="74" name="Straight Connector 73">
+            <a:extLst>
+              <a:ext uri="{FF2B5EF4-FFF2-40B4-BE49-F238E27FC236}">
+                <a16:creationId xmlns:a16="http://schemas.microsoft.com/office/drawing/2014/main" id="{999B94C6-B631-9A4F-9314-C5EA1BB78BE7}"/>
+              </a:ext>
+            </a:extLst>
+          </p:cNvPr>
+          <p:cNvCxnSpPr>
+            <a:cxnSpLocks/>
+          </p:cNvCxnSpPr>
+          <p:nvPr/>
+        </p:nvCxnSpPr>
+        <p:spPr bwMode="auto">
+          <a:xfrm>
+            <a:off x="5699491" y="3125681"/>
+            <a:ext cx="600439" cy="584759"/>
+          </a:xfrm>
+          <a:prstGeom prst="line">
+            <a:avLst/>
+          </a:prstGeom>
+          <a:solidFill>
+            <a:schemeClr val="accent1"/>
+          </a:solidFill>
+          <a:ln w="28575" cap="flat" cmpd="sng" algn="ctr">
+            <a:solidFill>
+              <a:srgbClr val="00B050"/>
+            </a:solidFill>
+            <a:prstDash val="solid"/>
+            <a:round/>
+            <a:headEnd type="none" w="med" len="med"/>
+            <a:tailEnd type="none" w="med" len="med"/>
+          </a:ln>
+          <a:effectLst/>
+        </p:spPr>
+      </p:cxnSp>
+      <p:cxnSp>
+        <p:nvCxnSpPr>
+          <p:cNvPr id="75" name="Elbow Connector 74">
+            <a:extLst>
+              <a:ext uri="{FF2B5EF4-FFF2-40B4-BE49-F238E27FC236}">
+                <a16:creationId xmlns:a16="http://schemas.microsoft.com/office/drawing/2014/main" id="{95637415-6B0F-4643-A4AE-EC39357138CB}"/>
+              </a:ext>
+            </a:extLst>
+          </p:cNvPr>
+          <p:cNvCxnSpPr>
+            <a:stCxn id="67" idx="0"/>
+          </p:cNvCxnSpPr>
+          <p:nvPr/>
+        </p:nvCxnSpPr>
+        <p:spPr bwMode="auto">
+          <a:xfrm rot="5400000" flipH="1" flipV="1">
+            <a:off x="4949664" y="-376098"/>
+            <a:ext cx="695895" cy="4124385"/>
+          </a:xfrm>
+          <a:prstGeom prst="bentConnector2">
+            <a:avLst/>
+          </a:prstGeom>
+          <a:solidFill>
+            <a:schemeClr val="accent1"/>
+          </a:solidFill>
+          <a:ln w="28575" cap="flat" cmpd="sng" algn="ctr">
+            <a:solidFill>
+              <a:schemeClr val="tx1"/>
+            </a:solidFill>
+            <a:prstDash val="solid"/>
+            <a:round/>
+            <a:headEnd type="none" w="med" len="med"/>
+            <a:tailEnd type="arrow" w="med" len="med"/>
+          </a:ln>
+          <a:effectLst/>
+        </p:spPr>
+      </p:cxnSp>
+      <p:cxnSp>
+        <p:nvCxnSpPr>
+          <p:cNvPr id="76" name="Straight Connector 75">
+            <a:extLst>
+              <a:ext uri="{FF2B5EF4-FFF2-40B4-BE49-F238E27FC236}">
+                <a16:creationId xmlns:a16="http://schemas.microsoft.com/office/drawing/2014/main" id="{F410AD3E-6E9D-704E-B364-102B241B04EF}"/>
+              </a:ext>
+            </a:extLst>
+          </p:cNvPr>
+          <p:cNvCxnSpPr>
+            <a:cxnSpLocks/>
+          </p:cNvCxnSpPr>
+          <p:nvPr/>
+        </p:nvCxnSpPr>
+        <p:spPr bwMode="auto">
+          <a:xfrm>
+            <a:off x="5699491" y="1338147"/>
+            <a:ext cx="0" cy="695894"/>
+          </a:xfrm>
+          <a:prstGeom prst="line">
+            <a:avLst/>
+          </a:prstGeom>
+          <a:solidFill>
+            <a:schemeClr val="accent1"/>
+          </a:solidFill>
+          <a:ln w="28575" cap="flat" cmpd="sng" algn="ctr">
+            <a:solidFill>
+              <a:schemeClr val="tx1"/>
+            </a:solidFill>
+            <a:prstDash val="solid"/>
+            <a:round/>
+            <a:headEnd type="none" w="med" len="med"/>
+            <a:tailEnd type="none" w="med" len="med"/>
+          </a:ln>
+          <a:effectLst/>
+        </p:spPr>
+      </p:cxnSp>
+      <p:sp>
+        <p:nvSpPr>
+          <p:cNvPr id="77" name="Oval 76">
+            <a:extLst>
+              <a:ext uri="{FF2B5EF4-FFF2-40B4-BE49-F238E27FC236}">
+                <a16:creationId xmlns:a16="http://schemas.microsoft.com/office/drawing/2014/main" id="{2F4CEECD-66EC-0340-9F62-C681A3B01AF9}"/>
+              </a:ext>
+            </a:extLst>
+          </p:cNvPr>
+          <p:cNvSpPr/>
+          <p:nvPr/>
+        </p:nvSpPr>
+        <p:spPr bwMode="auto">
+          <a:xfrm>
+            <a:off x="7449016" y="1297262"/>
+            <a:ext cx="66908" cy="66908"/>
+          </a:xfrm>
+          <a:prstGeom prst="ellipse">
+            <a:avLst/>
+          </a:prstGeom>
+          <a:solidFill>
+            <a:schemeClr val="accent2"/>
+          </a:solidFill>
+          <a:ln w="9525" cap="flat" cmpd="sng" algn="ctr">
+            <a:solidFill>
+              <a:schemeClr val="tx1"/>
+            </a:solidFill>
+            <a:prstDash val="solid"/>
+            <a:round/>
+            <a:headEnd type="none" w="med" len="med"/>
+            <a:tailEnd type="none" w="med" len="med"/>
+          </a:ln>
+          <a:effectLst/>
+        </p:spPr>
+        <p:txBody>
+          <a:bodyPr vert="horz" wrap="square" lIns="91440" tIns="45720" rIns="91440" bIns="45720" numCol="1" rtlCol="0" anchor="t" anchorCtr="0" compatLnSpc="1">
+            <a:prstTxWarp prst="textNoShape">
+              <a:avLst/>
+            </a:prstTxWarp>
+          </a:bodyPr>
+          <a:lstStyle/>
+          <a:p>
+            <a:pPr marL="0" marR="0" indent="0" algn="l" defTabSz="914400" rtl="0" eaLnBrk="0" fontAlgn="base" latinLnBrk="0" hangingPunct="0">
+              <a:lnSpc>
+                <a:spcPct val="100000"/>
+              </a:lnSpc>
+              <a:spcBef>
+                <a:spcPct val="0"/>
+              </a:spcBef>
+              <a:spcAft>
+                <a:spcPct val="0"/>
+              </a:spcAft>
+              <a:buClrTx/>
+              <a:buSzTx/>
+              <a:buFontTx/>
+              <a:buNone/>
+              <a:tabLst/>
+            </a:pPr>
+            <a:endParaRPr kumimoji="0" lang="en-US" sz="2400" b="0" i="0" u="none" strike="noStrike" cap="none" normalizeH="0" baseline="0" dirty="0">
+              <a:ln>
+                <a:noFill/>
+              </a:ln>
+              <a:solidFill>
+                <a:schemeClr val="tx1"/>
+              </a:solidFill>
+              <a:effectLst/>
+              <a:latin typeface="Arial" pitchFamily="-65" charset="0"/>
+              <a:ea typeface="ＭＳ Ｐゴシック" pitchFamily="-65" charset="-128"/>
+              <a:cs typeface="ＭＳ Ｐゴシック" pitchFamily="-65" charset="-128"/>
+            </a:endParaRPr>
+          </a:p>
+        </p:txBody>
+      </p:sp>
+      <p:sp>
+        <p:nvSpPr>
+          <p:cNvPr id="78" name="Oval 77">
+            <a:extLst>
+              <a:ext uri="{FF2B5EF4-FFF2-40B4-BE49-F238E27FC236}">
+                <a16:creationId xmlns:a16="http://schemas.microsoft.com/office/drawing/2014/main" id="{50418162-1F6C-A348-9444-BBF9F6AB9DBB}"/>
+              </a:ext>
+            </a:extLst>
+          </p:cNvPr>
+          <p:cNvSpPr/>
+          <p:nvPr/>
+        </p:nvSpPr>
+        <p:spPr bwMode="auto">
+          <a:xfrm>
+            <a:off x="7601416" y="1297262"/>
+            <a:ext cx="66908" cy="66908"/>
+          </a:xfrm>
+          <a:prstGeom prst="ellipse">
+            <a:avLst/>
+          </a:prstGeom>
+          <a:solidFill>
+            <a:schemeClr val="accent2"/>
+          </a:solidFill>
+          <a:ln w="9525" cap="flat" cmpd="sng" algn="ctr">
+            <a:solidFill>
+              <a:schemeClr val="tx1"/>
+            </a:solidFill>
+            <a:prstDash val="solid"/>
+            <a:round/>
+            <a:headEnd type="none" w="med" len="med"/>
+            <a:tailEnd type="none" w="med" len="med"/>
+          </a:ln>
+          <a:effectLst/>
+        </p:spPr>
+        <p:txBody>
+          <a:bodyPr vert="horz" wrap="square" lIns="91440" tIns="45720" rIns="91440" bIns="45720" numCol="1" rtlCol="0" anchor="t" anchorCtr="0" compatLnSpc="1">
+            <a:prstTxWarp prst="textNoShape">
+              <a:avLst/>
+            </a:prstTxWarp>
+          </a:bodyPr>
+          <a:lstStyle/>
+          <a:p>
+            <a:pPr marL="0" marR="0" indent="0" algn="l" defTabSz="914400" rtl="0" eaLnBrk="0" fontAlgn="base" latinLnBrk="0" hangingPunct="0">
+              <a:lnSpc>
+                <a:spcPct val="100000"/>
+              </a:lnSpc>
+              <a:spcBef>
+                <a:spcPct val="0"/>
+              </a:spcBef>
+              <a:spcAft>
+                <a:spcPct val="0"/>
+              </a:spcAft>
+              <a:buClrTx/>
+              <a:buSzTx/>
+              <a:buFontTx/>
+              <a:buNone/>
+              <a:tabLst/>
+            </a:pPr>
+            <a:endParaRPr kumimoji="0" lang="en-US" sz="2400" b="0" i="0" u="none" strike="noStrike" cap="none" normalizeH="0" baseline="0" dirty="0">
+              <a:ln>
+                <a:noFill/>
+              </a:ln>
+              <a:solidFill>
+                <a:schemeClr val="tx1"/>
+              </a:solidFill>
+              <a:effectLst/>
+              <a:latin typeface="Arial" pitchFamily="-65" charset="0"/>
+              <a:ea typeface="ＭＳ Ｐゴシック" pitchFamily="-65" charset="-128"/>
+              <a:cs typeface="ＭＳ Ｐゴシック" pitchFamily="-65" charset="-128"/>
+            </a:endParaRPr>
+          </a:p>
+        </p:txBody>
+      </p:sp>
+      <p:sp>
+        <p:nvSpPr>
+          <p:cNvPr id="79" name="Oval 78">
+            <a:extLst>
+              <a:ext uri="{FF2B5EF4-FFF2-40B4-BE49-F238E27FC236}">
+                <a16:creationId xmlns:a16="http://schemas.microsoft.com/office/drawing/2014/main" id="{352452E3-E48C-5246-BE0C-0748C7A5B8E2}"/>
+              </a:ext>
+            </a:extLst>
+          </p:cNvPr>
+          <p:cNvSpPr/>
+          <p:nvPr/>
+        </p:nvSpPr>
+        <p:spPr bwMode="auto">
+          <a:xfrm>
+            <a:off x="7753816" y="1297262"/>
+            <a:ext cx="66908" cy="66908"/>
+          </a:xfrm>
+          <a:prstGeom prst="ellipse">
+            <a:avLst/>
+          </a:prstGeom>
+          <a:solidFill>
+            <a:schemeClr val="accent2"/>
+          </a:solidFill>
+          <a:ln w="9525" cap="flat" cmpd="sng" algn="ctr">
+            <a:solidFill>
+              <a:schemeClr val="tx1"/>
+            </a:solidFill>
+            <a:prstDash val="solid"/>
+            <a:round/>
+            <a:headEnd type="none" w="med" len="med"/>
+            <a:tailEnd type="none" w="med" len="med"/>
+          </a:ln>
+          <a:effectLst/>
+        </p:spPr>
+        <p:txBody>
+          <a:bodyPr vert="horz" wrap="square" lIns="91440" tIns="45720" rIns="91440" bIns="45720" numCol="1" rtlCol="0" anchor="t" anchorCtr="0" compatLnSpc="1">
+            <a:prstTxWarp prst="textNoShape">
+              <a:avLst/>
+            </a:prstTxWarp>
+          </a:bodyPr>
+          <a:lstStyle/>
+          <a:p>
+            <a:pPr marL="0" marR="0" indent="0" algn="l" defTabSz="914400" rtl="0" eaLnBrk="0" fontAlgn="base" latinLnBrk="0" hangingPunct="0">
+              <a:lnSpc>
+                <a:spcPct val="100000"/>
+              </a:lnSpc>
+              <a:spcBef>
+                <a:spcPct val="0"/>
+              </a:spcBef>
+              <a:spcAft>
+                <a:spcPct val="0"/>
+              </a:spcAft>
+              <a:buClrTx/>
+              <a:buSzTx/>
+              <a:buFontTx/>
+              <a:buNone/>
+              <a:tabLst/>
+            </a:pPr>
+            <a:endParaRPr kumimoji="0" lang="en-US" sz="2400" b="0" i="0" u="none" strike="noStrike" cap="none" normalizeH="0" baseline="0" dirty="0">
+              <a:ln>
+                <a:noFill/>
+              </a:ln>
+              <a:solidFill>
+                <a:schemeClr val="tx1"/>
+              </a:solidFill>
+              <a:effectLst/>
+              <a:latin typeface="Arial" pitchFamily="-65" charset="0"/>
+              <a:ea typeface="ＭＳ Ｐゴシック" pitchFamily="-65" charset="-128"/>
+              <a:cs typeface="ＭＳ Ｐゴシック" pitchFamily="-65" charset="-128"/>
+            </a:endParaRPr>
+          </a:p>
+        </p:txBody>
+      </p:sp>
+      <p:sp>
+        <p:nvSpPr>
+          <p:cNvPr id="14" name="Down Arrow 13">
+            <a:extLst>
+              <a:ext uri="{FF2B5EF4-FFF2-40B4-BE49-F238E27FC236}">
+                <a16:creationId xmlns:a16="http://schemas.microsoft.com/office/drawing/2014/main" id="{DF83E1EE-56E3-6B42-9893-0131A6FDE4FE}"/>
+              </a:ext>
+            </a:extLst>
+          </p:cNvPr>
+          <p:cNvSpPr/>
+          <p:nvPr/>
+        </p:nvSpPr>
+        <p:spPr bwMode="auto">
+          <a:xfrm>
+            <a:off x="3173011" y="2436408"/>
+            <a:ext cx="142618" cy="413357"/>
+          </a:xfrm>
+          <a:prstGeom prst="downArrow">
+            <a:avLst/>
+          </a:prstGeom>
+          <a:solidFill>
+            <a:srgbClr val="FF0000"/>
+          </a:solidFill>
+          <a:ln w="9525" cap="flat" cmpd="sng" algn="ctr">
+            <a:solidFill>
+              <a:schemeClr val="tx1"/>
+            </a:solidFill>
+            <a:prstDash val="solid"/>
+            <a:round/>
+            <a:headEnd type="none" w="med" len="med"/>
+            <a:tailEnd type="none" w="med" len="med"/>
+          </a:ln>
+          <a:effectLst/>
+        </p:spPr>
+        <p:txBody>
+          <a:bodyPr vert="horz" wrap="square" lIns="91440" tIns="45720" rIns="91440" bIns="45720" numCol="1" rtlCol="0" anchor="t" anchorCtr="0" compatLnSpc="1">
+            <a:prstTxWarp prst="textNoShape">
+              <a:avLst/>
+            </a:prstTxWarp>
+          </a:bodyPr>
+          <a:lstStyle/>
+          <a:p>
+            <a:pPr marL="0" marR="0" indent="0" algn="l" defTabSz="914400" rtl="0" eaLnBrk="0" fontAlgn="base" latinLnBrk="0" hangingPunct="0">
+              <a:lnSpc>
+                <a:spcPct val="100000"/>
+              </a:lnSpc>
+              <a:spcBef>
+                <a:spcPct val="0"/>
+              </a:spcBef>
+              <a:spcAft>
+                <a:spcPct val="0"/>
+              </a:spcAft>
+              <a:buClrTx/>
+              <a:buSzTx/>
+              <a:buFontTx/>
+              <a:buNone/>
+              <a:tabLst/>
+            </a:pPr>
+            <a:endParaRPr kumimoji="0" lang="en-US" sz="2400" b="0" i="0" u="none" strike="noStrike" cap="none" normalizeH="0" baseline="0" dirty="0">
+              <a:ln>
+                <a:noFill/>
+              </a:ln>
+              <a:solidFill>
+                <a:schemeClr val="tx1"/>
+              </a:solidFill>
+              <a:effectLst/>
+              <a:latin typeface="Arial" pitchFamily="-65" charset="0"/>
+              <a:ea typeface="ＭＳ Ｐゴシック" pitchFamily="-65" charset="-128"/>
+              <a:cs typeface="ＭＳ Ｐゴシック" pitchFamily="-65" charset="-128"/>
+            </a:endParaRPr>
+          </a:p>
+        </p:txBody>
+      </p:sp>
+      <p:cxnSp>
+        <p:nvCxnSpPr>
+          <p:cNvPr id="22" name="Straight Arrow Connector 21">
+            <a:extLst>
+              <a:ext uri="{FF2B5EF4-FFF2-40B4-BE49-F238E27FC236}">
+                <a16:creationId xmlns:a16="http://schemas.microsoft.com/office/drawing/2014/main" id="{05A3288E-B5CD-F54A-AC7D-79CFE64DB813}"/>
+              </a:ext>
+            </a:extLst>
+          </p:cNvPr>
+          <p:cNvCxnSpPr>
+            <a:cxnSpLocks/>
+            <a:endCxn id="66" idx="7"/>
+          </p:cNvCxnSpPr>
+          <p:nvPr/>
+        </p:nvCxnSpPr>
+        <p:spPr bwMode="auto">
+          <a:xfrm flipH="1">
+            <a:off x="2557954" y="3517165"/>
+            <a:ext cx="661503" cy="1134784"/>
+          </a:xfrm>
+          <a:prstGeom prst="straightConnector1">
+            <a:avLst/>
+          </a:prstGeom>
+          <a:solidFill>
+            <a:schemeClr val="accent1"/>
+          </a:solidFill>
+          <a:ln w="38100" cap="flat" cmpd="sng" algn="ctr">
+            <a:solidFill>
+              <a:srgbClr val="FF0000"/>
+            </a:solidFill>
+            <a:prstDash val="sysDot"/>
+            <a:round/>
+            <a:headEnd type="none" w="med" len="med"/>
+            <a:tailEnd type="triangle"/>
+          </a:ln>
+          <a:effectLst/>
+        </p:spPr>
+      </p:cxnSp>
+      <p:sp>
+        <p:nvSpPr>
+          <p:cNvPr id="24" name="Curved Down Arrow 23">
+            <a:extLst>
+              <a:ext uri="{FF2B5EF4-FFF2-40B4-BE49-F238E27FC236}">
+                <a16:creationId xmlns:a16="http://schemas.microsoft.com/office/drawing/2014/main" id="{66B9229C-41EF-F646-ABF9-0C7ACDF78F2C}"/>
+              </a:ext>
+            </a:extLst>
+          </p:cNvPr>
+          <p:cNvSpPr/>
+          <p:nvPr/>
+        </p:nvSpPr>
+        <p:spPr bwMode="auto">
+          <a:xfrm flipH="1">
+            <a:off x="3486615" y="1426358"/>
+            <a:ext cx="1847428" cy="685037"/>
+          </a:xfrm>
+          <a:prstGeom prst="curvedDownArrow">
+            <a:avLst/>
+          </a:prstGeom>
+          <a:solidFill>
+            <a:srgbClr val="FF0000"/>
+          </a:solidFill>
+          <a:ln w="9525" cap="flat" cmpd="sng" algn="ctr">
+            <a:solidFill>
+              <a:schemeClr val="tx1"/>
+            </a:solidFill>
+            <a:prstDash val="solid"/>
+            <a:round/>
+            <a:headEnd type="none" w="med" len="med"/>
+            <a:tailEnd type="none" w="med" len="med"/>
+          </a:ln>
+          <a:effectLst/>
+        </p:spPr>
+        <p:txBody>
+          <a:bodyPr vert="horz" wrap="square" lIns="91440" tIns="45720" rIns="91440" bIns="45720" numCol="1" rtlCol="0" anchor="t" anchorCtr="0" compatLnSpc="1">
+            <a:prstTxWarp prst="textNoShape">
+              <a:avLst/>
+            </a:prstTxWarp>
+          </a:bodyPr>
+          <a:lstStyle/>
+          <a:p>
+            <a:pPr marL="0" marR="0" indent="0" algn="l" defTabSz="914400" rtl="0" eaLnBrk="0" fontAlgn="base" latinLnBrk="0" hangingPunct="0">
+              <a:lnSpc>
+                <a:spcPct val="100000"/>
+              </a:lnSpc>
+              <a:spcBef>
+                <a:spcPct val="0"/>
+              </a:spcBef>
+              <a:spcAft>
+                <a:spcPct val="0"/>
+              </a:spcAft>
+              <a:buClrTx/>
+              <a:buSzTx/>
+              <a:buFontTx/>
+              <a:buNone/>
+              <a:tabLst/>
+            </a:pPr>
+            <a:endParaRPr kumimoji="0" lang="en-US" sz="2400" b="0" i="0" u="none" strike="noStrike" cap="none" normalizeH="0" baseline="0" dirty="0">
+              <a:ln>
+                <a:noFill/>
+              </a:ln>
+              <a:solidFill>
+                <a:schemeClr val="tx1"/>
+              </a:solidFill>
+              <a:effectLst/>
+              <a:latin typeface="Arial" pitchFamily="-65" charset="0"/>
+              <a:ea typeface="ＭＳ Ｐゴシック" pitchFamily="-65" charset="-128"/>
+              <a:cs typeface="ＭＳ Ｐゴシック" pitchFamily="-65" charset="-128"/>
+            </a:endParaRPr>
+          </a:p>
+        </p:txBody>
+      </p:sp>
+      <p:sp>
+        <p:nvSpPr>
+          <p:cNvPr id="4" name="TextBox 3">
+            <a:extLst>
+              <a:ext uri="{FF2B5EF4-FFF2-40B4-BE49-F238E27FC236}">
+                <a16:creationId xmlns:a16="http://schemas.microsoft.com/office/drawing/2014/main" id="{64F0B002-55A0-3346-A8E2-C1AB8840363F}"/>
+              </a:ext>
+            </a:extLst>
+          </p:cNvPr>
+          <p:cNvSpPr txBox="1"/>
+          <p:nvPr/>
+        </p:nvSpPr>
+        <p:spPr>
+          <a:xfrm>
+            <a:off x="1717517" y="3734454"/>
+            <a:ext cx="784866" cy="523220"/>
+          </a:xfrm>
+          <a:prstGeom prst="rect">
+            <a:avLst/>
+          </a:prstGeom>
+          <a:noFill/>
+        </p:spPr>
+        <p:txBody>
+          <a:bodyPr wrap="square" rtlCol="0">
+            <a:spAutoFit/>
+          </a:bodyPr>
+          <a:lstStyle/>
+          <a:p>
+            <a:pPr algn="ctr"/>
+            <a:r>
+              <a:rPr lang="en-US" sz="1400" dirty="0">
+                <a:solidFill>
+                  <a:srgbClr val="FF0000"/>
+                </a:solidFill>
+              </a:rPr>
+              <a:t>stdout</a:t>
+            </a:r>
+          </a:p>
+          <a:p>
+            <a:pPr algn="ctr"/>
+            <a:r>
+              <a:rPr lang="en-US" sz="1400" dirty="0">
+                <a:solidFill>
+                  <a:srgbClr val="FF0000"/>
+                </a:solidFill>
+              </a:rPr>
+              <a:t>stderr</a:t>
+            </a:r>
+          </a:p>
+        </p:txBody>
+      </p:sp>
+      <p:sp>
+        <p:nvSpPr>
+          <p:cNvPr id="26" name="Curved Down Arrow 25">
+            <a:extLst>
+              <a:ext uri="{FF2B5EF4-FFF2-40B4-BE49-F238E27FC236}">
+                <a16:creationId xmlns:a16="http://schemas.microsoft.com/office/drawing/2014/main" id="{8BCB2258-860B-6E44-804A-925A9BFBCE19}"/>
+              </a:ext>
+            </a:extLst>
+          </p:cNvPr>
+          <p:cNvSpPr/>
+          <p:nvPr/>
+        </p:nvSpPr>
+        <p:spPr bwMode="auto">
+          <a:xfrm flipH="1">
+            <a:off x="1918010" y="4237800"/>
+            <a:ext cx="604638" cy="363936"/>
+          </a:xfrm>
+          <a:prstGeom prst="curvedDownArrow">
+            <a:avLst/>
+          </a:prstGeom>
+          <a:solidFill>
+            <a:srgbClr val="FF0000"/>
+          </a:solidFill>
+          <a:ln w="9525" cap="flat" cmpd="sng" algn="ctr">
+            <a:solidFill>
+              <a:schemeClr val="tx1"/>
+            </a:solidFill>
+            <a:prstDash val="solid"/>
+            <a:round/>
+            <a:headEnd type="none" w="med" len="med"/>
+            <a:tailEnd type="none" w="med" len="med"/>
+          </a:ln>
+          <a:effectLst/>
+        </p:spPr>
+        <p:txBody>
+          <a:bodyPr vert="horz" wrap="square" lIns="91440" tIns="45720" rIns="91440" bIns="45720" numCol="1" rtlCol="0" anchor="t" anchorCtr="0" compatLnSpc="1">
+            <a:prstTxWarp prst="textNoShape">
+              <a:avLst/>
+            </a:prstTxWarp>
+          </a:bodyPr>
+          <a:lstStyle/>
+          <a:p>
+            <a:pPr marL="0" marR="0" indent="0" algn="l" defTabSz="914400" rtl="0" eaLnBrk="0" fontAlgn="base" latinLnBrk="0" hangingPunct="0">
+              <a:lnSpc>
+                <a:spcPct val="100000"/>
+              </a:lnSpc>
+              <a:spcBef>
+                <a:spcPct val="0"/>
+              </a:spcBef>
+              <a:spcAft>
+                <a:spcPct val="0"/>
+              </a:spcAft>
+              <a:buClrTx/>
+              <a:buSzTx/>
+              <a:buFontTx/>
+              <a:buNone/>
+              <a:tabLst/>
+            </a:pPr>
+            <a:endParaRPr kumimoji="0" lang="en-US" sz="2400" b="0" i="0" u="none" strike="noStrike" cap="none" normalizeH="0" baseline="0" dirty="0">
+              <a:ln>
+                <a:noFill/>
+              </a:ln>
+              <a:solidFill>
+                <a:schemeClr val="tx1"/>
+              </a:solidFill>
+              <a:effectLst/>
+              <a:latin typeface="Arial" pitchFamily="-65" charset="0"/>
+              <a:ea typeface="ＭＳ Ｐゴシック" pitchFamily="-65" charset="-128"/>
+              <a:cs typeface="ＭＳ Ｐゴシック" pitchFamily="-65" charset="-128"/>
+            </a:endParaRPr>
+          </a:p>
+        </p:txBody>
+      </p:sp>
+      <p:cxnSp>
+        <p:nvCxnSpPr>
+          <p:cNvPr id="3" name="Straight Arrow Connector 2">
+            <a:extLst>
+              <a:ext uri="{FF2B5EF4-FFF2-40B4-BE49-F238E27FC236}">
+                <a16:creationId xmlns:a16="http://schemas.microsoft.com/office/drawing/2014/main" id="{FCBDA6AB-AAB1-2F49-9C4B-CBB7A5219DAB}"/>
+              </a:ext>
+            </a:extLst>
+          </p:cNvPr>
+          <p:cNvCxnSpPr>
+            <a:stCxn id="72" idx="0"/>
+            <a:endCxn id="70" idx="4"/>
+          </p:cNvCxnSpPr>
+          <p:nvPr/>
+        </p:nvCxnSpPr>
+        <p:spPr bwMode="auto">
+          <a:xfrm flipH="1" flipV="1">
+            <a:off x="5699491" y="3125681"/>
+            <a:ext cx="600439" cy="584759"/>
+          </a:xfrm>
+          <a:prstGeom prst="straightConnector1">
+            <a:avLst/>
+          </a:prstGeom>
+          <a:solidFill>
+            <a:schemeClr val="accent1"/>
+          </a:solidFill>
+          <a:ln w="28575" cap="flat" cmpd="sng" algn="ctr">
+            <a:solidFill>
+              <a:srgbClr val="FF0000"/>
+            </a:solidFill>
+            <a:prstDash val="sysDash"/>
+            <a:round/>
+            <a:headEnd type="none" w="med" len="med"/>
+            <a:tailEnd type="triangle"/>
+          </a:ln>
+          <a:effectLst/>
+        </p:spPr>
+      </p:cxnSp>
+      <p:sp>
+        <p:nvSpPr>
+          <p:cNvPr id="5" name="TextBox 4">
+            <a:extLst>
+              <a:ext uri="{FF2B5EF4-FFF2-40B4-BE49-F238E27FC236}">
+                <a16:creationId xmlns:a16="http://schemas.microsoft.com/office/drawing/2014/main" id="{0565B44A-4570-8A4F-B186-DACD80E9D507}"/>
+              </a:ext>
+            </a:extLst>
+          </p:cNvPr>
+          <p:cNvSpPr txBox="1"/>
+          <p:nvPr/>
+        </p:nvSpPr>
+        <p:spPr>
+          <a:xfrm>
+            <a:off x="6036228" y="3209388"/>
+            <a:ext cx="1289135" cy="307777"/>
+          </a:xfrm>
+          <a:prstGeom prst="rect">
+            <a:avLst/>
+          </a:prstGeom>
+          <a:noFill/>
+        </p:spPr>
+        <p:txBody>
+          <a:bodyPr wrap="none" rtlCol="0">
+            <a:spAutoFit/>
+          </a:bodyPr>
+          <a:lstStyle/>
+          <a:p>
+            <a:r>
+              <a:rPr lang="en-US" sz="1400" dirty="0"/>
+              <a:t>PMIx_Log_nb</a:t>
+            </a:r>
+          </a:p>
+        </p:txBody>
+      </p:sp>
+      <p:sp>
+        <p:nvSpPr>
+          <p:cNvPr id="30" name="Down Arrow 29">
+            <a:extLst>
+              <a:ext uri="{FF2B5EF4-FFF2-40B4-BE49-F238E27FC236}">
+                <a16:creationId xmlns:a16="http://schemas.microsoft.com/office/drawing/2014/main" id="{AB49BF00-AC9F-124E-A1D9-F2EB97FF5F63}"/>
+              </a:ext>
+            </a:extLst>
+          </p:cNvPr>
+          <p:cNvSpPr/>
+          <p:nvPr/>
+        </p:nvSpPr>
+        <p:spPr bwMode="auto">
+          <a:xfrm flipV="1">
+            <a:off x="5637082" y="2327487"/>
+            <a:ext cx="124815" cy="291645"/>
+          </a:xfrm>
+          <a:prstGeom prst="downArrow">
+            <a:avLst/>
+          </a:prstGeom>
+          <a:solidFill>
+            <a:srgbClr val="FF0000"/>
+          </a:solidFill>
+          <a:ln w="9525" cap="flat" cmpd="sng" algn="ctr">
+            <a:solidFill>
+              <a:schemeClr val="tx1"/>
+            </a:solidFill>
+            <a:prstDash val="solid"/>
+            <a:round/>
+            <a:headEnd type="none" w="med" len="med"/>
+            <a:tailEnd type="none" w="med" len="med"/>
+          </a:ln>
+          <a:effectLst/>
+        </p:spPr>
+        <p:txBody>
+          <a:bodyPr vert="horz" wrap="square" lIns="91440" tIns="45720" rIns="91440" bIns="45720" numCol="1" rtlCol="0" anchor="t" anchorCtr="0" compatLnSpc="1">
+            <a:prstTxWarp prst="textNoShape">
+              <a:avLst/>
+            </a:prstTxWarp>
+          </a:bodyPr>
+          <a:lstStyle/>
+          <a:p>
+            <a:pPr marL="0" marR="0" indent="0" algn="l" defTabSz="914400" rtl="0" eaLnBrk="0" fontAlgn="base" latinLnBrk="0" hangingPunct="0">
+              <a:lnSpc>
+                <a:spcPct val="100000"/>
+              </a:lnSpc>
+              <a:spcBef>
+                <a:spcPct val="0"/>
+              </a:spcBef>
+              <a:spcAft>
+                <a:spcPct val="0"/>
+              </a:spcAft>
+              <a:buClrTx/>
+              <a:buSzTx/>
+              <a:buFontTx/>
+              <a:buNone/>
+              <a:tabLst/>
+            </a:pPr>
+            <a:endParaRPr kumimoji="0" lang="en-US" sz="2400" b="0" i="0" u="none" strike="noStrike" cap="none" normalizeH="0" baseline="0" dirty="0">
+              <a:ln>
+                <a:noFill/>
+              </a:ln>
+              <a:solidFill>
+                <a:schemeClr val="tx1"/>
+              </a:solidFill>
+              <a:effectLst/>
+              <a:latin typeface="Arial" pitchFamily="-65" charset="0"/>
+              <a:ea typeface="ＭＳ Ｐゴシック" pitchFamily="-65" charset="-128"/>
+              <a:cs typeface="ＭＳ Ｐゴシック" pitchFamily="-65" charset="-128"/>
+            </a:endParaRPr>
+          </a:p>
+        </p:txBody>
+      </p:sp>
+      <p:sp>
+        <p:nvSpPr>
+          <p:cNvPr id="8" name="TextBox 7">
+            <a:extLst>
+              <a:ext uri="{FF2B5EF4-FFF2-40B4-BE49-F238E27FC236}">
+                <a16:creationId xmlns:a16="http://schemas.microsoft.com/office/drawing/2014/main" id="{C166E5DD-51E0-C747-A932-893039886B40}"/>
+              </a:ext>
+            </a:extLst>
+          </p:cNvPr>
+          <p:cNvSpPr txBox="1"/>
+          <p:nvPr/>
+        </p:nvSpPr>
+        <p:spPr>
+          <a:xfrm>
+            <a:off x="6540775" y="2695876"/>
+            <a:ext cx="707517" cy="307777"/>
+          </a:xfrm>
+          <a:prstGeom prst="rect">
+            <a:avLst/>
+          </a:prstGeom>
+          <a:noFill/>
+        </p:spPr>
+        <p:txBody>
+          <a:bodyPr wrap="square" rtlCol="0">
+            <a:spAutoFit/>
+          </a:bodyPr>
+          <a:lstStyle/>
+          <a:p>
+            <a:r>
+              <a:rPr lang="en-US" sz="1400" dirty="0">
+                <a:solidFill>
+                  <a:srgbClr val="FF0000"/>
+                </a:solidFill>
+              </a:rPr>
+              <a:t>syslog</a:t>
+            </a:r>
+          </a:p>
+        </p:txBody>
+      </p:sp>
+      <p:cxnSp>
+        <p:nvCxnSpPr>
+          <p:cNvPr id="12" name="Straight Arrow Connector 11">
+            <a:extLst>
+              <a:ext uri="{FF2B5EF4-FFF2-40B4-BE49-F238E27FC236}">
+                <a16:creationId xmlns:a16="http://schemas.microsoft.com/office/drawing/2014/main" id="{3C9099C4-8E4C-6843-8BA1-B1C3CDAF5BB4}"/>
+              </a:ext>
+            </a:extLst>
+          </p:cNvPr>
+          <p:cNvCxnSpPr>
+            <a:cxnSpLocks/>
+            <a:stCxn id="70" idx="6"/>
+            <a:endCxn id="8" idx="1"/>
+          </p:cNvCxnSpPr>
+          <p:nvPr/>
+        </p:nvCxnSpPr>
+        <p:spPr bwMode="auto">
+          <a:xfrm flipV="1">
+            <a:off x="6148786" y="2849765"/>
+            <a:ext cx="391989" cy="1"/>
+          </a:xfrm>
+          <a:prstGeom prst="straightConnector1">
+            <a:avLst/>
+          </a:prstGeom>
+          <a:solidFill>
+            <a:schemeClr val="accent1"/>
+          </a:solidFill>
+          <a:ln w="28575" cap="flat" cmpd="sng" algn="ctr">
+            <a:solidFill>
+              <a:srgbClr val="FF0000"/>
+            </a:solidFill>
+            <a:prstDash val="solid"/>
+            <a:round/>
+            <a:headEnd type="none" w="med" len="med"/>
+            <a:tailEnd type="triangle"/>
+          </a:ln>
+          <a:effectLst/>
+        </p:spPr>
+      </p:cxnSp>
+      <p:sp>
+        <p:nvSpPr>
+          <p:cNvPr id="41" name="TextBox 40">
+            <a:extLst>
+              <a:ext uri="{FF2B5EF4-FFF2-40B4-BE49-F238E27FC236}">
+                <a16:creationId xmlns:a16="http://schemas.microsoft.com/office/drawing/2014/main" id="{D78F2CA8-C034-424A-93CD-95F9E3AE5D85}"/>
+              </a:ext>
+            </a:extLst>
+          </p:cNvPr>
+          <p:cNvSpPr txBox="1"/>
+          <p:nvPr/>
+        </p:nvSpPr>
+        <p:spPr>
+          <a:xfrm>
+            <a:off x="1212335" y="2753277"/>
+            <a:ext cx="836807" cy="738664"/>
+          </a:xfrm>
+          <a:prstGeom prst="rect">
+            <a:avLst/>
+          </a:prstGeom>
+          <a:noFill/>
+        </p:spPr>
+        <p:txBody>
+          <a:bodyPr wrap="square" rtlCol="0">
+            <a:spAutoFit/>
+          </a:bodyPr>
+          <a:lstStyle/>
+          <a:p>
+            <a:pPr algn="ctr"/>
+            <a:r>
+              <a:rPr lang="en-US" sz="1400" dirty="0">
+                <a:solidFill>
+                  <a:srgbClr val="FF0000"/>
+                </a:solidFill>
+              </a:rPr>
+              <a:t>syslog</a:t>
+            </a:r>
+          </a:p>
+          <a:p>
+            <a:pPr algn="ctr"/>
+            <a:r>
+              <a:rPr lang="en-US" sz="1400" dirty="0">
+                <a:solidFill>
+                  <a:srgbClr val="FF0000"/>
+                </a:solidFill>
+              </a:rPr>
+              <a:t>email</a:t>
+            </a:r>
+          </a:p>
+          <a:p>
+            <a:pPr algn="ctr"/>
+            <a:r>
+              <a:rPr lang="en-US" sz="1400" dirty="0">
+                <a:solidFill>
+                  <a:srgbClr val="FF0000"/>
+                </a:solidFill>
+              </a:rPr>
+              <a:t>db</a:t>
+            </a:r>
+          </a:p>
+        </p:txBody>
+      </p:sp>
+      <p:cxnSp>
+        <p:nvCxnSpPr>
+          <p:cNvPr id="42" name="Straight Arrow Connector 41">
+            <a:extLst>
+              <a:ext uri="{FF2B5EF4-FFF2-40B4-BE49-F238E27FC236}">
+                <a16:creationId xmlns:a16="http://schemas.microsoft.com/office/drawing/2014/main" id="{8D0E98CA-B10D-714D-8CD0-0B543C15CD18}"/>
+              </a:ext>
+            </a:extLst>
+          </p:cNvPr>
+          <p:cNvCxnSpPr>
+            <a:cxnSpLocks/>
+            <a:stCxn id="41" idx="3"/>
+            <a:endCxn id="64" idx="2"/>
+          </p:cNvCxnSpPr>
+          <p:nvPr/>
+        </p:nvCxnSpPr>
+        <p:spPr bwMode="auto">
+          <a:xfrm>
+            <a:off x="2049142" y="3122609"/>
+            <a:ext cx="619669" cy="0"/>
+          </a:xfrm>
+          <a:prstGeom prst="straightConnector1">
+            <a:avLst/>
+          </a:prstGeom>
+          <a:solidFill>
+            <a:schemeClr val="accent1"/>
+          </a:solidFill>
+          <a:ln w="28575" cap="flat" cmpd="sng" algn="ctr">
+            <a:solidFill>
+              <a:srgbClr val="FF0000"/>
+            </a:solidFill>
+            <a:prstDash val="solid"/>
+            <a:round/>
+            <a:headEnd type="triangle" w="med" len="med"/>
+            <a:tailEnd type="none" w="med" len="med"/>
+          </a:ln>
+          <a:effectLst/>
+        </p:spPr>
+      </p:cxnSp>
+      <p:sp>
+        <p:nvSpPr>
+          <p:cNvPr id="28" name="TextBox 27">
+            <a:extLst>
+              <a:ext uri="{FF2B5EF4-FFF2-40B4-BE49-F238E27FC236}">
+                <a16:creationId xmlns:a16="http://schemas.microsoft.com/office/drawing/2014/main" id="{F6B25971-3A0E-2B4B-BD67-63BD747552F4}"/>
+              </a:ext>
+            </a:extLst>
+          </p:cNvPr>
+          <p:cNvSpPr txBox="1"/>
+          <p:nvPr/>
+        </p:nvSpPr>
+        <p:spPr>
+          <a:xfrm>
+            <a:off x="1128696" y="2042335"/>
+            <a:ext cx="979755" cy="523220"/>
+          </a:xfrm>
+          <a:prstGeom prst="rect">
+            <a:avLst/>
+          </a:prstGeom>
+          <a:noFill/>
+        </p:spPr>
+        <p:txBody>
+          <a:bodyPr wrap="none" rtlCol="0">
+            <a:spAutoFit/>
+          </a:bodyPr>
+          <a:lstStyle/>
+          <a:p>
+            <a:pPr algn="ctr"/>
+            <a:r>
+              <a:rPr lang="en-US" sz="1400" dirty="0">
+                <a:solidFill>
+                  <a:srgbClr val="FF0000"/>
+                </a:solidFill>
+              </a:rPr>
+              <a:t>job record</a:t>
+            </a:r>
+          </a:p>
+          <a:p>
+            <a:pPr algn="ctr"/>
+            <a:r>
+              <a:rPr lang="en-US" sz="1400" dirty="0">
+                <a:solidFill>
+                  <a:srgbClr val="FF0000"/>
+                </a:solidFill>
+              </a:rPr>
+              <a:t>global db</a:t>
+            </a:r>
+          </a:p>
+        </p:txBody>
+      </p:sp>
+      <p:cxnSp>
+        <p:nvCxnSpPr>
+          <p:cNvPr id="50" name="Straight Arrow Connector 49">
+            <a:extLst>
+              <a:ext uri="{FF2B5EF4-FFF2-40B4-BE49-F238E27FC236}">
+                <a16:creationId xmlns:a16="http://schemas.microsoft.com/office/drawing/2014/main" id="{D07D00C8-F91C-7545-B87A-4399BC11D2CB}"/>
+              </a:ext>
+            </a:extLst>
+          </p:cNvPr>
+          <p:cNvCxnSpPr>
+            <a:cxnSpLocks/>
+            <a:stCxn id="28" idx="3"/>
+            <a:endCxn id="63" idx="1"/>
+          </p:cNvCxnSpPr>
+          <p:nvPr/>
+        </p:nvCxnSpPr>
+        <p:spPr bwMode="auto">
+          <a:xfrm>
+            <a:off x="2108451" y="2303945"/>
+            <a:ext cx="794986" cy="1"/>
+          </a:xfrm>
+          <a:prstGeom prst="straightConnector1">
+            <a:avLst/>
+          </a:prstGeom>
+          <a:solidFill>
+            <a:schemeClr val="accent1"/>
+          </a:solidFill>
+          <a:ln w="28575" cap="flat" cmpd="sng" algn="ctr">
+            <a:solidFill>
+              <a:srgbClr val="FF0000"/>
+            </a:solidFill>
+            <a:prstDash val="solid"/>
+            <a:round/>
+            <a:headEnd type="triangle" w="med" len="med"/>
+            <a:tailEnd type="none" w="med" len="med"/>
+          </a:ln>
+          <a:effectLst/>
+        </p:spPr>
+      </p:cxnSp>
+      <p:sp>
+        <p:nvSpPr>
+          <p:cNvPr id="2" name="Rectangle 1">
+            <a:extLst>
+              <a:ext uri="{FF2B5EF4-FFF2-40B4-BE49-F238E27FC236}">
+                <a16:creationId xmlns:a16="http://schemas.microsoft.com/office/drawing/2014/main" id="{8A1A11C1-40D4-FE4D-A222-00CCAC5FFAE2}"/>
+              </a:ext>
+            </a:extLst>
+          </p:cNvPr>
+          <p:cNvSpPr/>
+          <p:nvPr/>
+        </p:nvSpPr>
+        <p:spPr bwMode="auto">
+          <a:xfrm>
+            <a:off x="1128696" y="4103785"/>
+            <a:ext cx="687557" cy="1261703"/>
+          </a:xfrm>
+          <a:prstGeom prst="rect">
+            <a:avLst/>
+          </a:prstGeom>
+          <a:solidFill>
+            <a:schemeClr val="bg1"/>
+          </a:solidFill>
+          <a:ln w="9525" cap="flat" cmpd="sng" algn="ctr">
+            <a:noFill/>
+            <a:prstDash val="solid"/>
+            <a:round/>
+            <a:headEnd type="none" w="med" len="med"/>
+            <a:tailEnd type="none" w="med" len="med"/>
+          </a:ln>
+          <a:effectLst/>
+        </p:spPr>
+        <p:txBody>
+          <a:bodyPr vert="horz" wrap="square" lIns="91440" tIns="45720" rIns="91440" bIns="45720" numCol="1" rtlCol="0" anchor="t" anchorCtr="0" compatLnSpc="1">
+            <a:prstTxWarp prst="textNoShape">
+              <a:avLst/>
+            </a:prstTxWarp>
+          </a:bodyPr>
+          <a:lstStyle/>
+          <a:p>
+            <a:pPr marL="0" marR="0" indent="0" algn="l" defTabSz="914400" rtl="0" eaLnBrk="0" fontAlgn="base" latinLnBrk="0" hangingPunct="0">
+              <a:lnSpc>
+                <a:spcPct val="100000"/>
+              </a:lnSpc>
+              <a:spcBef>
+                <a:spcPct val="0"/>
+              </a:spcBef>
+              <a:spcAft>
+                <a:spcPct val="0"/>
+              </a:spcAft>
+              <a:buClrTx/>
+              <a:buSzTx/>
+              <a:buFontTx/>
+              <a:buNone/>
+              <a:tabLst/>
+            </a:pPr>
+            <a:endParaRPr kumimoji="0" lang="en-US" sz="2400" b="0" i="0" u="none" strike="noStrike" cap="none" normalizeH="0" baseline="0">
+              <a:ln>
+                <a:noFill/>
+              </a:ln>
+              <a:solidFill>
+                <a:schemeClr val="tx1"/>
+              </a:solidFill>
+              <a:effectLst/>
+              <a:latin typeface="Arial" pitchFamily="-65" charset="0"/>
+              <a:ea typeface="ＭＳ Ｐゴシック" pitchFamily="-65" charset="-128"/>
+              <a:cs typeface="ＭＳ Ｐゴシック" pitchFamily="-65" charset="-128"/>
+            </a:endParaRPr>
+          </a:p>
+        </p:txBody>
+      </p:sp>
+    </p:spTree>
+    <p:extLst>
+      <p:ext uri="{BB962C8B-B14F-4D97-AF65-F5344CB8AC3E}">
+        <p14:creationId xmlns:p14="http://schemas.microsoft.com/office/powerpoint/2010/main" val="1814546738"/>
       </p:ext>
     </p:extLst>
   </p:cSld>

</xml_diff>